<commit_message>
2de versie ppt + pdf versie van ppt
2de (finale) versie voor de 1ste presentatie
+ pdf versie van deze powerpoint
</commit_message>
<xml_diff>
--- a/doc/Lab Farm presentatie.pptx
+++ b/doc/Lab Farm presentatie.pptx
@@ -12,7 +12,6 @@
     <p:sldId id="259" r:id="rId6"/>
     <p:sldId id="260" r:id="rId7"/>
     <p:sldId id="261" r:id="rId8"/>
-    <p:sldId id="262" r:id="rId9"/>
   </p:sldIdLst>
   <p:sldSz cx="12192000" cy="6858000"/>
   <p:notesSz cx="6858000" cy="9144000"/>
@@ -111,6 +110,11 @@
       </a:defRPr>
     </a:lvl9pPr>
   </p:defaultTextStyle>
+  <p:extLst>
+    <p:ext uri="{EFAFB233-063F-42B5-8137-9DF3F51BA10A}">
+      <p15:sldGuideLst xmlns:p15="http://schemas.microsoft.com/office/powerpoint/2012/main"/>
+    </p:ext>
+  </p:extLst>
 </p:presentation>
 </file>
 
@@ -836,7 +840,7 @@
           <a:p>
             <a:fld id="{9837742D-952A-47C9-8F72-638020BEACC8}" type="datetimeFigureOut">
               <a:rPr lang="nl-BE" smtClean="0"/>
-              <a:t>26/09/2018</a:t>
+              <a:t>27/09/2018</a:t>
             </a:fld>
             <a:endParaRPr lang="nl-BE"/>
           </a:p>
@@ -878,7 +882,7 @@
           <a:p>
             <a:fld id="{3C08DB06-7D7B-46B3-90C1-53FB40F75625}" type="slidenum">
               <a:rPr lang="nl-BE" smtClean="0"/>
-              <a:t>‹nr.›</a:t>
+              <a:t>‹#›</a:t>
             </a:fld>
             <a:endParaRPr lang="nl-BE"/>
           </a:p>
@@ -1087,7 +1091,7 @@
           <a:p>
             <a:fld id="{9837742D-952A-47C9-8F72-638020BEACC8}" type="datetimeFigureOut">
               <a:rPr lang="nl-BE" smtClean="0"/>
-              <a:t>26/09/2018</a:t>
+              <a:t>27/09/2018</a:t>
             </a:fld>
             <a:endParaRPr lang="nl-BE"/>
           </a:p>
@@ -1129,7 +1133,7 @@
           <a:p>
             <a:fld id="{3C08DB06-7D7B-46B3-90C1-53FB40F75625}" type="slidenum">
               <a:rPr lang="nl-BE" smtClean="0"/>
-              <a:t>‹nr.›</a:t>
+              <a:t>‹#›</a:t>
             </a:fld>
             <a:endParaRPr lang="nl-BE"/>
           </a:p>
@@ -1401,7 +1405,7 @@
           <a:p>
             <a:fld id="{9837742D-952A-47C9-8F72-638020BEACC8}" type="datetimeFigureOut">
               <a:rPr lang="nl-BE" smtClean="0"/>
-              <a:t>26/09/2018</a:t>
+              <a:t>27/09/2018</a:t>
             </a:fld>
             <a:endParaRPr lang="nl-BE"/>
           </a:p>
@@ -1443,7 +1447,7 @@
           <a:p>
             <a:fld id="{3C08DB06-7D7B-46B3-90C1-53FB40F75625}" type="slidenum">
               <a:rPr lang="nl-BE" smtClean="0"/>
-              <a:t>‹nr.›</a:t>
+              <a:t>‹#›</a:t>
             </a:fld>
             <a:endParaRPr lang="nl-BE"/>
           </a:p>
@@ -1742,7 +1746,7 @@
           <a:p>
             <a:fld id="{9837742D-952A-47C9-8F72-638020BEACC8}" type="datetimeFigureOut">
               <a:rPr lang="nl-BE" smtClean="0"/>
-              <a:t>26/09/2018</a:t>
+              <a:t>27/09/2018</a:t>
             </a:fld>
             <a:endParaRPr lang="nl-BE"/>
           </a:p>
@@ -1784,7 +1788,7 @@
           <a:p>
             <a:fld id="{3C08DB06-7D7B-46B3-90C1-53FB40F75625}" type="slidenum">
               <a:rPr lang="nl-BE" smtClean="0"/>
-              <a:t>‹nr.›</a:t>
+              <a:t>‹#›</a:t>
             </a:fld>
             <a:endParaRPr lang="nl-BE"/>
           </a:p>
@@ -2056,7 +2060,7 @@
           <a:p>
             <a:fld id="{9837742D-952A-47C9-8F72-638020BEACC8}" type="datetimeFigureOut">
               <a:rPr lang="nl-BE" smtClean="0"/>
-              <a:t>26/09/2018</a:t>
+              <a:t>27/09/2018</a:t>
             </a:fld>
             <a:endParaRPr lang="nl-BE"/>
           </a:p>
@@ -2098,7 +2102,7 @@
           <a:p>
             <a:fld id="{3C08DB06-7D7B-46B3-90C1-53FB40F75625}" type="slidenum">
               <a:rPr lang="nl-BE" smtClean="0"/>
-              <a:t>‹nr.›</a:t>
+              <a:t>‹#›</a:t>
             </a:fld>
             <a:endParaRPr lang="nl-BE"/>
           </a:p>
@@ -2449,7 +2453,7 @@
           <a:p>
             <a:fld id="{9837742D-952A-47C9-8F72-638020BEACC8}" type="datetimeFigureOut">
               <a:rPr lang="nl-BE" smtClean="0"/>
-              <a:t>26/09/2018</a:t>
+              <a:t>27/09/2018</a:t>
             </a:fld>
             <a:endParaRPr lang="nl-BE"/>
           </a:p>
@@ -2491,7 +2495,7 @@
           <a:p>
             <a:fld id="{3C08DB06-7D7B-46B3-90C1-53FB40F75625}" type="slidenum">
               <a:rPr lang="nl-BE" smtClean="0"/>
-              <a:t>‹nr.›</a:t>
+              <a:t>‹#›</a:t>
             </a:fld>
             <a:endParaRPr lang="nl-BE"/>
           </a:p>
@@ -2619,7 +2623,7 @@
           <a:p>
             <a:fld id="{9837742D-952A-47C9-8F72-638020BEACC8}" type="datetimeFigureOut">
               <a:rPr lang="nl-BE" smtClean="0"/>
-              <a:t>26/09/2018</a:t>
+              <a:t>27/09/2018</a:t>
             </a:fld>
             <a:endParaRPr lang="nl-BE"/>
           </a:p>
@@ -2661,7 +2665,7 @@
           <a:p>
             <a:fld id="{3C08DB06-7D7B-46B3-90C1-53FB40F75625}" type="slidenum">
               <a:rPr lang="nl-BE" smtClean="0"/>
-              <a:t>‹nr.›</a:t>
+              <a:t>‹#›</a:t>
             </a:fld>
             <a:endParaRPr lang="nl-BE"/>
           </a:p>
@@ -2799,7 +2803,7 @@
           <a:p>
             <a:fld id="{9837742D-952A-47C9-8F72-638020BEACC8}" type="datetimeFigureOut">
               <a:rPr lang="nl-BE" smtClean="0"/>
-              <a:t>26/09/2018</a:t>
+              <a:t>27/09/2018</a:t>
             </a:fld>
             <a:endParaRPr lang="nl-BE"/>
           </a:p>
@@ -2841,7 +2845,7 @@
           <a:p>
             <a:fld id="{3C08DB06-7D7B-46B3-90C1-53FB40F75625}" type="slidenum">
               <a:rPr lang="nl-BE" smtClean="0"/>
-              <a:t>‹nr.›</a:t>
+              <a:t>‹#›</a:t>
             </a:fld>
             <a:endParaRPr lang="nl-BE"/>
           </a:p>
@@ -2975,7 +2979,7 @@
           <a:p>
             <a:fld id="{9837742D-952A-47C9-8F72-638020BEACC8}" type="datetimeFigureOut">
               <a:rPr lang="nl-BE" smtClean="0"/>
-              <a:t>26/09/2018</a:t>
+              <a:t>27/09/2018</a:t>
             </a:fld>
             <a:endParaRPr lang="nl-BE"/>
           </a:p>
@@ -3017,7 +3021,7 @@
           <a:p>
             <a:fld id="{3C08DB06-7D7B-46B3-90C1-53FB40F75625}" type="slidenum">
               <a:rPr lang="nl-BE" smtClean="0"/>
-              <a:t>‹nr.›</a:t>
+              <a:t>‹#›</a:t>
             </a:fld>
             <a:endParaRPr lang="nl-BE"/>
           </a:p>
@@ -3222,7 +3226,7 @@
           <a:p>
             <a:fld id="{9837742D-952A-47C9-8F72-638020BEACC8}" type="datetimeFigureOut">
               <a:rPr lang="nl-BE" smtClean="0"/>
-              <a:t>26/09/2018</a:t>
+              <a:t>27/09/2018</a:t>
             </a:fld>
             <a:endParaRPr lang="nl-BE"/>
           </a:p>
@@ -3264,7 +3268,7 @@
           <a:p>
             <a:fld id="{3C08DB06-7D7B-46B3-90C1-53FB40F75625}" type="slidenum">
               <a:rPr lang="nl-BE" smtClean="0"/>
-              <a:t>‹nr.›</a:t>
+              <a:t>‹#›</a:t>
             </a:fld>
             <a:endParaRPr lang="nl-BE"/>
           </a:p>
@@ -3454,7 +3458,7 @@
           <a:p>
             <a:fld id="{9837742D-952A-47C9-8F72-638020BEACC8}" type="datetimeFigureOut">
               <a:rPr lang="nl-BE" smtClean="0"/>
-              <a:t>26/09/2018</a:t>
+              <a:t>27/09/2018</a:t>
             </a:fld>
             <a:endParaRPr lang="nl-BE"/>
           </a:p>
@@ -3496,7 +3500,7 @@
           <a:p>
             <a:fld id="{3C08DB06-7D7B-46B3-90C1-53FB40F75625}" type="slidenum">
               <a:rPr lang="nl-BE" smtClean="0"/>
-              <a:t>‹nr.›</a:t>
+              <a:t>‹#›</a:t>
             </a:fld>
             <a:endParaRPr lang="nl-BE"/>
           </a:p>
@@ -3828,7 +3832,7 @@
           <a:p>
             <a:fld id="{9837742D-952A-47C9-8F72-638020BEACC8}" type="datetimeFigureOut">
               <a:rPr lang="nl-BE" smtClean="0"/>
-              <a:t>26/09/2018</a:t>
+              <a:t>27/09/2018</a:t>
             </a:fld>
             <a:endParaRPr lang="nl-BE"/>
           </a:p>
@@ -3870,7 +3874,7 @@
           <a:p>
             <a:fld id="{3C08DB06-7D7B-46B3-90C1-53FB40F75625}" type="slidenum">
               <a:rPr lang="nl-BE" smtClean="0"/>
-              <a:t>‹nr.›</a:t>
+              <a:t>‹#›</a:t>
             </a:fld>
             <a:endParaRPr lang="nl-BE"/>
           </a:p>
@@ -3951,7 +3955,7 @@
           <a:p>
             <a:fld id="{9837742D-952A-47C9-8F72-638020BEACC8}" type="datetimeFigureOut">
               <a:rPr lang="nl-BE" smtClean="0"/>
-              <a:t>26/09/2018</a:t>
+              <a:t>27/09/2018</a:t>
             </a:fld>
             <a:endParaRPr lang="nl-BE"/>
           </a:p>
@@ -3993,7 +3997,7 @@
           <a:p>
             <a:fld id="{3C08DB06-7D7B-46B3-90C1-53FB40F75625}" type="slidenum">
               <a:rPr lang="nl-BE" smtClean="0"/>
-              <a:t>‹nr.›</a:t>
+              <a:t>‹#›</a:t>
             </a:fld>
             <a:endParaRPr lang="nl-BE"/>
           </a:p>
@@ -4046,7 +4050,7 @@
           <a:p>
             <a:fld id="{9837742D-952A-47C9-8F72-638020BEACC8}" type="datetimeFigureOut">
               <a:rPr lang="nl-BE" smtClean="0"/>
-              <a:t>26/09/2018</a:t>
+              <a:t>27/09/2018</a:t>
             </a:fld>
             <a:endParaRPr lang="nl-BE"/>
           </a:p>
@@ -4088,7 +4092,7 @@
           <a:p>
             <a:fld id="{3C08DB06-7D7B-46B3-90C1-53FB40F75625}" type="slidenum">
               <a:rPr lang="nl-BE" smtClean="0"/>
-              <a:t>‹nr.›</a:t>
+              <a:t>‹#›</a:t>
             </a:fld>
             <a:endParaRPr lang="nl-BE"/>
           </a:p>
@@ -4301,7 +4305,7 @@
           <a:p>
             <a:fld id="{9837742D-952A-47C9-8F72-638020BEACC8}" type="datetimeFigureOut">
               <a:rPr lang="nl-BE" smtClean="0"/>
-              <a:t>26/09/2018</a:t>
+              <a:t>27/09/2018</a:t>
             </a:fld>
             <a:endParaRPr lang="nl-BE"/>
           </a:p>
@@ -4343,7 +4347,7 @@
           <a:p>
             <a:fld id="{3C08DB06-7D7B-46B3-90C1-53FB40F75625}" type="slidenum">
               <a:rPr lang="nl-BE" smtClean="0"/>
-              <a:t>‹nr.›</a:t>
+              <a:t>‹#›</a:t>
             </a:fld>
             <a:endParaRPr lang="nl-BE"/>
           </a:p>
@@ -4564,7 +4568,7 @@
           <a:p>
             <a:fld id="{9837742D-952A-47C9-8F72-638020BEACC8}" type="datetimeFigureOut">
               <a:rPr lang="nl-BE" smtClean="0"/>
-              <a:t>26/09/2018</a:t>
+              <a:t>27/09/2018</a:t>
             </a:fld>
             <a:endParaRPr lang="nl-BE"/>
           </a:p>
@@ -4606,7 +4610,7 @@
           <a:p>
             <a:fld id="{3C08DB06-7D7B-46B3-90C1-53FB40F75625}" type="slidenum">
               <a:rPr lang="nl-BE" smtClean="0"/>
-              <a:t>‹nr.›</a:t>
+              <a:t>‹#›</a:t>
             </a:fld>
             <a:endParaRPr lang="nl-BE"/>
           </a:p>
@@ -5307,7 +5311,7 @@
           <a:p>
             <a:fld id="{9837742D-952A-47C9-8F72-638020BEACC8}" type="datetimeFigureOut">
               <a:rPr lang="nl-BE" smtClean="0"/>
-              <a:t>26/09/2018</a:t>
+              <a:t>27/09/2018</a:t>
             </a:fld>
             <a:endParaRPr lang="nl-BE"/>
           </a:p>
@@ -5383,7 +5387,7 @@
           <a:p>
             <a:fld id="{3C08DB06-7D7B-46B3-90C1-53FB40F75625}" type="slidenum">
               <a:rPr lang="nl-BE" smtClean="0"/>
-              <a:t>‹nr.›</a:t>
+              <a:t>‹#›</a:t>
             </a:fld>
             <a:endParaRPr lang="nl-BE"/>
           </a:p>
@@ -6399,6 +6403,12 @@
             </a:r>
           </a:p>
           <a:p>
+            <a:r>
+              <a:rPr lang="nl-BE" dirty="0"/>
+              <a:t>Microsoft Azure</a:t>
+            </a:r>
+          </a:p>
+          <a:p>
             <a:endParaRPr lang="nl-BE" dirty="0"/>
           </a:p>
         </p:txBody>
@@ -6477,14 +6487,21 @@
             <p:ph idx="1"/>
           </p:nvPr>
         </p:nvSpPr>
-        <p:spPr/>
-        <p:txBody>
-          <a:bodyPr/>
+        <p:spPr>
+          <a:xfrm>
+            <a:off x="677334" y="2160590"/>
+            <a:ext cx="8596668" cy="4315712"/>
+          </a:xfrm>
+        </p:spPr>
+        <p:txBody>
+          <a:bodyPr>
+            <a:normAutofit fontScale="92500" lnSpcReduction="10000"/>
+          </a:bodyPr>
           <a:lstStyle/>
           <a:p>
             <a:r>
               <a:rPr lang="nl-BE" dirty="0"/>
-              <a:t>DHT11,DHT22 – Temperatuur &amp; luchtvochtigheid sensor</a:t>
+              <a:t>DHT22 – Temperatuur &amp; luchtvochtigheid sensor</a:t>
             </a:r>
           </a:p>
           <a:p>
@@ -6496,6 +6513,12 @@
           <a:p>
             <a:r>
               <a:rPr lang="nl-BE" dirty="0"/>
+              <a:t>SEN-11050 – Temperatuur sensor (waterproof)</a:t>
+            </a:r>
+          </a:p>
+          <a:p>
+            <a:r>
+              <a:rPr lang="nl-BE" dirty="0"/>
               <a:t>SEN-10972 – pH sensor</a:t>
             </a:r>
           </a:p>
@@ -6508,15 +6531,7 @@
           <a:p>
             <a:r>
               <a:rPr lang="nl-BE" dirty="0"/>
-              <a:t>ESP8266 – </a:t>
-            </a:r>
-            <a:r>
-              <a:rPr lang="nl-BE" dirty="0" err="1"/>
-              <a:t>WiFi</a:t>
-            </a:r>
-            <a:r>
-              <a:rPr lang="nl-BE" dirty="0"/>
-              <a:t> module</a:t>
+              <a:t>SEN-0204 – Water niveau sensor</a:t>
             </a:r>
           </a:p>
           <a:p>
@@ -6565,15 +6580,19 @@
           <a:p>
             <a:r>
               <a:rPr lang="nl-BE" dirty="0"/>
-              <a:t>SLV – </a:t>
-            </a:r>
-            <a:r>
-              <a:rPr lang="nl-BE" dirty="0" err="1"/>
-              <a:t>Transformer</a:t>
-            </a:r>
+              <a:t>SLV – Transformer 60 W 12 V</a:t>
+            </a:r>
+          </a:p>
+          <a:p>
             <a:r>
               <a:rPr lang="nl-BE" dirty="0"/>
-              <a:t> 60 W 12 V</a:t>
+              <a:t>Kunststof water magneetventiel – 12V</a:t>
+            </a:r>
+          </a:p>
+          <a:p>
+            <a:r>
+              <a:rPr lang="nl-BE" dirty="0"/>
+              <a:t>SLV Transformer 60W 12V</a:t>
             </a:r>
           </a:p>
         </p:txBody>
@@ -6630,41 +6649,47 @@
           <a:lstStyle/>
           <a:p>
             <a:r>
-              <a:rPr lang="nl-BE" dirty="0" err="1"/>
-              <a:t>Plantenpot</a:t>
-            </a:r>
-            <a:r>
               <a:rPr lang="nl-BE" dirty="0"/>
-              <a:t> Hardware diagram</a:t>
-            </a:r>
-          </a:p>
-        </p:txBody>
-      </p:sp>
-      <p:sp>
-        <p:nvSpPr>
-          <p:cNvPr id="3" name="Tijdelijke aanduiding voor inhoud 2">
+              <a:t>Hardware diagram</a:t>
+            </a:r>
+          </a:p>
+        </p:txBody>
+      </p:sp>
+      <p:pic>
+        <p:nvPicPr>
+          <p:cNvPr id="5" name="Content Placeholder 4">
             <a:extLst>
               <a:ext uri="{FF2B5EF4-FFF2-40B4-BE49-F238E27FC236}">
-                <a16:creationId xmlns:a16="http://schemas.microsoft.com/office/drawing/2014/main" id="{93F57A1B-81E7-4E67-A51A-8812D7D0B94C}"/>
+                <a16:creationId xmlns:a16="http://schemas.microsoft.com/office/drawing/2014/main" id="{D73CB228-7069-40EB-85F4-67039A401373}"/>
               </a:ext>
             </a:extLst>
           </p:cNvPr>
-          <p:cNvSpPr>
-            <a:spLocks noGrp="1"/>
-          </p:cNvSpPr>
+          <p:cNvPicPr>
+            <a:picLocks noGrp="1" noChangeAspect="1"/>
+          </p:cNvPicPr>
           <p:nvPr>
             <p:ph idx="1"/>
           </p:nvPr>
-        </p:nvSpPr>
-        <p:spPr/>
-        <p:txBody>
-          <a:bodyPr/>
-          <a:lstStyle/>
-          <a:p>
-            <a:endParaRPr lang="nl-BE"/>
-          </a:p>
-        </p:txBody>
-      </p:sp>
+        </p:nvPicPr>
+        <p:blipFill>
+          <a:blip r:embed="rId2">
+            <a:extLst>
+              <a:ext uri="{28A0092B-C50C-407E-A947-70E740481C1C}">
+                <a14:useLocalDpi xmlns:a14="http://schemas.microsoft.com/office/drawing/2010/main" val="0"/>
+              </a:ext>
+            </a:extLst>
+          </a:blip>
+          <a:stretch>
+            <a:fillRect/>
+          </a:stretch>
+        </p:blipFill>
+        <p:spPr>
+          <a:xfrm>
+            <a:off x="677334" y="1267670"/>
+            <a:ext cx="7225404" cy="5119842"/>
+          </a:xfrm>
+        </p:spPr>
+      </p:pic>
     </p:spTree>
     <p:extLst>
       <p:ext uri="{BB962C8B-B14F-4D97-AF65-F5344CB8AC3E}">
@@ -6717,41 +6742,47 @@
           <a:lstStyle/>
           <a:p>
             <a:r>
-              <a:rPr lang="nl-BE" dirty="0" err="1"/>
-              <a:t>Plantenpot</a:t>
-            </a:r>
-            <a:r>
               <a:rPr lang="nl-BE" dirty="0"/>
-              <a:t> Software diagram</a:t>
-            </a:r>
-          </a:p>
-        </p:txBody>
-      </p:sp>
-      <p:sp>
-        <p:nvSpPr>
-          <p:cNvPr id="3" name="Tijdelijke aanduiding voor inhoud 2">
+              <a:t>Software diagram</a:t>
+            </a:r>
+          </a:p>
+        </p:txBody>
+      </p:sp>
+      <p:pic>
+        <p:nvPicPr>
+          <p:cNvPr id="5" name="Content Placeholder 4">
             <a:extLst>
               <a:ext uri="{FF2B5EF4-FFF2-40B4-BE49-F238E27FC236}">
-                <a16:creationId xmlns:a16="http://schemas.microsoft.com/office/drawing/2014/main" id="{0CEA6189-D0A4-4D17-B34D-FBDAC2CCB0C1}"/>
+                <a16:creationId xmlns:a16="http://schemas.microsoft.com/office/drawing/2014/main" id="{71BAD982-B2BD-4D1D-9904-4559AE1DE972}"/>
               </a:ext>
             </a:extLst>
           </p:cNvPr>
-          <p:cNvSpPr>
-            <a:spLocks noGrp="1"/>
-          </p:cNvSpPr>
+          <p:cNvPicPr>
+            <a:picLocks noGrp="1" noChangeAspect="1"/>
+          </p:cNvPicPr>
           <p:nvPr>
             <p:ph idx="1"/>
           </p:nvPr>
-        </p:nvSpPr>
-        <p:spPr/>
-        <p:txBody>
-          <a:bodyPr/>
-          <a:lstStyle/>
-          <a:p>
-            <a:endParaRPr lang="nl-BE"/>
-          </a:p>
-        </p:txBody>
-      </p:sp>
+        </p:nvPicPr>
+        <p:blipFill>
+          <a:blip r:embed="rId2">
+            <a:extLst>
+              <a:ext uri="{28A0092B-C50C-407E-A947-70E740481C1C}">
+                <a14:useLocalDpi xmlns:a14="http://schemas.microsoft.com/office/drawing/2010/main" val="0"/>
+              </a:ext>
+            </a:extLst>
+          </a:blip>
+          <a:stretch>
+            <a:fillRect/>
+          </a:stretch>
+        </p:blipFill>
+        <p:spPr>
+          <a:xfrm>
+            <a:off x="677334" y="1270000"/>
+            <a:ext cx="8014084" cy="5385579"/>
+          </a:xfrm>
+        </p:spPr>
+      </p:pic>
     </p:spTree>
     <p:extLst>
       <p:ext uri="{BB962C8B-B14F-4D97-AF65-F5344CB8AC3E}">
@@ -6805,120 +6836,50 @@
           <a:p>
             <a:r>
               <a:rPr lang="nl-BE" dirty="0"/>
-              <a:t>Web Dashboard Software Diagram</a:t>
-            </a:r>
-          </a:p>
-        </p:txBody>
-      </p:sp>
-      <p:sp>
-        <p:nvSpPr>
-          <p:cNvPr id="3" name="Tijdelijke aanduiding voor inhoud 2">
+              <a:t>Relationele databank diagram</a:t>
+            </a:r>
+          </a:p>
+        </p:txBody>
+      </p:sp>
+      <p:pic>
+        <p:nvPicPr>
+          <p:cNvPr id="5" name="Content Placeholder 4">
             <a:extLst>
               <a:ext uri="{FF2B5EF4-FFF2-40B4-BE49-F238E27FC236}">
-                <a16:creationId xmlns:a16="http://schemas.microsoft.com/office/drawing/2014/main" id="{5C1C13A4-2CBF-471D-BDBC-DA38BF720EA7}"/>
+                <a16:creationId xmlns:a16="http://schemas.microsoft.com/office/drawing/2014/main" id="{E188638D-303C-4011-990B-07C061C7674B}"/>
               </a:ext>
             </a:extLst>
           </p:cNvPr>
-          <p:cNvSpPr>
-            <a:spLocks noGrp="1"/>
-          </p:cNvSpPr>
+          <p:cNvPicPr>
+            <a:picLocks noGrp="1" noChangeAspect="1"/>
+          </p:cNvPicPr>
           <p:nvPr>
             <p:ph idx="1"/>
           </p:nvPr>
-        </p:nvSpPr>
-        <p:spPr/>
-        <p:txBody>
-          <a:bodyPr/>
-          <a:lstStyle/>
-          <a:p>
-            <a:endParaRPr lang="nl-BE"/>
-          </a:p>
-        </p:txBody>
-      </p:sp>
+        </p:nvPicPr>
+        <p:blipFill>
+          <a:blip r:embed="rId2">
+            <a:extLst>
+              <a:ext uri="{28A0092B-C50C-407E-A947-70E740481C1C}">
+                <a14:useLocalDpi xmlns:a14="http://schemas.microsoft.com/office/drawing/2010/main" val="0"/>
+              </a:ext>
+            </a:extLst>
+          </a:blip>
+          <a:stretch>
+            <a:fillRect/>
+          </a:stretch>
+        </p:blipFill>
+        <p:spPr>
+          <a:xfrm>
+            <a:off x="677690" y="1930399"/>
+            <a:ext cx="8596312" cy="2105891"/>
+          </a:xfrm>
+        </p:spPr>
+      </p:pic>
     </p:spTree>
     <p:extLst>
       <p:ext uri="{BB962C8B-B14F-4D97-AF65-F5344CB8AC3E}">
         <p14:creationId xmlns:p14="http://schemas.microsoft.com/office/powerpoint/2010/main" val="3042876883"/>
-      </p:ext>
-    </p:extLst>
-  </p:cSld>
-  <p:clrMapOvr>
-    <a:masterClrMapping/>
-  </p:clrMapOvr>
-</p:sld>
-</file>
-
-<file path=ppt/slides/slide8.xml><?xml version="1.0" encoding="utf-8"?>
-<p:sld xmlns:a="http://schemas.openxmlformats.org/drawingml/2006/main" xmlns:r="http://schemas.openxmlformats.org/officeDocument/2006/relationships" xmlns:p="http://schemas.openxmlformats.org/presentationml/2006/main">
-  <p:cSld>
-    <p:spTree>
-      <p:nvGrpSpPr>
-        <p:cNvPr id="1" name=""/>
-        <p:cNvGrpSpPr/>
-        <p:nvPr/>
-      </p:nvGrpSpPr>
-      <p:grpSpPr>
-        <a:xfrm>
-          <a:off x="0" y="0"/>
-          <a:ext cx="0" cy="0"/>
-          <a:chOff x="0" y="0"/>
-          <a:chExt cx="0" cy="0"/>
-        </a:xfrm>
-      </p:grpSpPr>
-      <p:sp>
-        <p:nvSpPr>
-          <p:cNvPr id="2" name="Titel 1">
-            <a:extLst>
-              <a:ext uri="{FF2B5EF4-FFF2-40B4-BE49-F238E27FC236}">
-                <a16:creationId xmlns:a16="http://schemas.microsoft.com/office/drawing/2014/main" id="{F661922E-51D0-452C-8761-F532B007DC6F}"/>
-              </a:ext>
-            </a:extLst>
-          </p:cNvPr>
-          <p:cNvSpPr>
-            <a:spLocks noGrp="1"/>
-          </p:cNvSpPr>
-          <p:nvPr>
-            <p:ph type="title"/>
-          </p:nvPr>
-        </p:nvSpPr>
-        <p:spPr/>
-        <p:txBody>
-          <a:bodyPr/>
-          <a:lstStyle/>
-          <a:p>
-            <a:endParaRPr lang="nl-BE"/>
-          </a:p>
-        </p:txBody>
-      </p:sp>
-      <p:sp>
-        <p:nvSpPr>
-          <p:cNvPr id="3" name="Tijdelijke aanduiding voor inhoud 2">
-            <a:extLst>
-              <a:ext uri="{FF2B5EF4-FFF2-40B4-BE49-F238E27FC236}">
-                <a16:creationId xmlns:a16="http://schemas.microsoft.com/office/drawing/2014/main" id="{15CF1779-43E4-4382-8012-ACB00662F98A}"/>
-              </a:ext>
-            </a:extLst>
-          </p:cNvPr>
-          <p:cNvSpPr>
-            <a:spLocks noGrp="1"/>
-          </p:cNvSpPr>
-          <p:nvPr>
-            <p:ph idx="1"/>
-          </p:nvPr>
-        </p:nvSpPr>
-        <p:spPr/>
-        <p:txBody>
-          <a:bodyPr/>
-          <a:lstStyle/>
-          <a:p>
-            <a:endParaRPr lang="nl-BE"/>
-          </a:p>
-        </p:txBody>
-      </p:sp>
-    </p:spTree>
-    <p:extLst>
-      <p:ext uri="{BB962C8B-B14F-4D97-AF65-F5344CB8AC3E}">
-        <p14:creationId xmlns:p14="http://schemas.microsoft.com/office/powerpoint/2010/main" val="3126229847"/>
       </p:ext>
     </p:extLst>
   </p:cSld>

</xml_diff>

<commit_message>
versie 3 ppt en pdf
</commit_message>
<xml_diff>
--- a/doc/Lab Farm presentatie.pptx
+++ b/doc/Lab Farm presentatie.pptx
@@ -9,9 +9,10 @@
     <p:sldId id="263" r:id="rId3"/>
     <p:sldId id="257" r:id="rId4"/>
     <p:sldId id="258" r:id="rId5"/>
-    <p:sldId id="259" r:id="rId6"/>
-    <p:sldId id="260" r:id="rId7"/>
-    <p:sldId id="261" r:id="rId8"/>
+    <p:sldId id="264" r:id="rId6"/>
+    <p:sldId id="259" r:id="rId7"/>
+    <p:sldId id="260" r:id="rId8"/>
+    <p:sldId id="261" r:id="rId9"/>
   </p:sldIdLst>
   <p:sldSz cx="12192000" cy="6858000"/>
   <p:notesSz cx="6858000" cy="9144000"/>
@@ -840,7 +841,7 @@
           <a:p>
             <a:fld id="{9837742D-952A-47C9-8F72-638020BEACC8}" type="datetimeFigureOut">
               <a:rPr lang="nl-BE" smtClean="0"/>
-              <a:t>27/09/2018</a:t>
+              <a:t>28/09/2018</a:t>
             </a:fld>
             <a:endParaRPr lang="nl-BE"/>
           </a:p>
@@ -1091,7 +1092,7 @@
           <a:p>
             <a:fld id="{9837742D-952A-47C9-8F72-638020BEACC8}" type="datetimeFigureOut">
               <a:rPr lang="nl-BE" smtClean="0"/>
-              <a:t>27/09/2018</a:t>
+              <a:t>28/09/2018</a:t>
             </a:fld>
             <a:endParaRPr lang="nl-BE"/>
           </a:p>
@@ -1405,7 +1406,7 @@
           <a:p>
             <a:fld id="{9837742D-952A-47C9-8F72-638020BEACC8}" type="datetimeFigureOut">
               <a:rPr lang="nl-BE" smtClean="0"/>
-              <a:t>27/09/2018</a:t>
+              <a:t>28/09/2018</a:t>
             </a:fld>
             <a:endParaRPr lang="nl-BE"/>
           </a:p>
@@ -1746,7 +1747,7 @@
           <a:p>
             <a:fld id="{9837742D-952A-47C9-8F72-638020BEACC8}" type="datetimeFigureOut">
               <a:rPr lang="nl-BE" smtClean="0"/>
-              <a:t>27/09/2018</a:t>
+              <a:t>28/09/2018</a:t>
             </a:fld>
             <a:endParaRPr lang="nl-BE"/>
           </a:p>
@@ -2060,7 +2061,7 @@
           <a:p>
             <a:fld id="{9837742D-952A-47C9-8F72-638020BEACC8}" type="datetimeFigureOut">
               <a:rPr lang="nl-BE" smtClean="0"/>
-              <a:t>27/09/2018</a:t>
+              <a:t>28/09/2018</a:t>
             </a:fld>
             <a:endParaRPr lang="nl-BE"/>
           </a:p>
@@ -2453,7 +2454,7 @@
           <a:p>
             <a:fld id="{9837742D-952A-47C9-8F72-638020BEACC8}" type="datetimeFigureOut">
               <a:rPr lang="nl-BE" smtClean="0"/>
-              <a:t>27/09/2018</a:t>
+              <a:t>28/09/2018</a:t>
             </a:fld>
             <a:endParaRPr lang="nl-BE"/>
           </a:p>
@@ -2623,7 +2624,7 @@
           <a:p>
             <a:fld id="{9837742D-952A-47C9-8F72-638020BEACC8}" type="datetimeFigureOut">
               <a:rPr lang="nl-BE" smtClean="0"/>
-              <a:t>27/09/2018</a:t>
+              <a:t>28/09/2018</a:t>
             </a:fld>
             <a:endParaRPr lang="nl-BE"/>
           </a:p>
@@ -2803,7 +2804,7 @@
           <a:p>
             <a:fld id="{9837742D-952A-47C9-8F72-638020BEACC8}" type="datetimeFigureOut">
               <a:rPr lang="nl-BE" smtClean="0"/>
-              <a:t>27/09/2018</a:t>
+              <a:t>28/09/2018</a:t>
             </a:fld>
             <a:endParaRPr lang="nl-BE"/>
           </a:p>
@@ -2979,7 +2980,7 @@
           <a:p>
             <a:fld id="{9837742D-952A-47C9-8F72-638020BEACC8}" type="datetimeFigureOut">
               <a:rPr lang="nl-BE" smtClean="0"/>
-              <a:t>27/09/2018</a:t>
+              <a:t>28/09/2018</a:t>
             </a:fld>
             <a:endParaRPr lang="nl-BE"/>
           </a:p>
@@ -3226,7 +3227,7 @@
           <a:p>
             <a:fld id="{9837742D-952A-47C9-8F72-638020BEACC8}" type="datetimeFigureOut">
               <a:rPr lang="nl-BE" smtClean="0"/>
-              <a:t>27/09/2018</a:t>
+              <a:t>28/09/2018</a:t>
             </a:fld>
             <a:endParaRPr lang="nl-BE"/>
           </a:p>
@@ -3458,7 +3459,7 @@
           <a:p>
             <a:fld id="{9837742D-952A-47C9-8F72-638020BEACC8}" type="datetimeFigureOut">
               <a:rPr lang="nl-BE" smtClean="0"/>
-              <a:t>27/09/2018</a:t>
+              <a:t>28/09/2018</a:t>
             </a:fld>
             <a:endParaRPr lang="nl-BE"/>
           </a:p>
@@ -3832,7 +3833,7 @@
           <a:p>
             <a:fld id="{9837742D-952A-47C9-8F72-638020BEACC8}" type="datetimeFigureOut">
               <a:rPr lang="nl-BE" smtClean="0"/>
-              <a:t>27/09/2018</a:t>
+              <a:t>28/09/2018</a:t>
             </a:fld>
             <a:endParaRPr lang="nl-BE"/>
           </a:p>
@@ -3955,7 +3956,7 @@
           <a:p>
             <a:fld id="{9837742D-952A-47C9-8F72-638020BEACC8}" type="datetimeFigureOut">
               <a:rPr lang="nl-BE" smtClean="0"/>
-              <a:t>27/09/2018</a:t>
+              <a:t>28/09/2018</a:t>
             </a:fld>
             <a:endParaRPr lang="nl-BE"/>
           </a:p>
@@ -4050,7 +4051,7 @@
           <a:p>
             <a:fld id="{9837742D-952A-47C9-8F72-638020BEACC8}" type="datetimeFigureOut">
               <a:rPr lang="nl-BE" smtClean="0"/>
-              <a:t>27/09/2018</a:t>
+              <a:t>28/09/2018</a:t>
             </a:fld>
             <a:endParaRPr lang="nl-BE"/>
           </a:p>
@@ -4305,7 +4306,7 @@
           <a:p>
             <a:fld id="{9837742D-952A-47C9-8F72-638020BEACC8}" type="datetimeFigureOut">
               <a:rPr lang="nl-BE" smtClean="0"/>
-              <a:t>27/09/2018</a:t>
+              <a:t>28/09/2018</a:t>
             </a:fld>
             <a:endParaRPr lang="nl-BE"/>
           </a:p>
@@ -4568,7 +4569,7 @@
           <a:p>
             <a:fld id="{9837742D-952A-47C9-8F72-638020BEACC8}" type="datetimeFigureOut">
               <a:rPr lang="nl-BE" smtClean="0"/>
-              <a:t>27/09/2018</a:t>
+              <a:t>28/09/2018</a:t>
             </a:fld>
             <a:endParaRPr lang="nl-BE"/>
           </a:p>
@@ -5311,7 +5312,7 @@
           <a:p>
             <a:fld id="{9837742D-952A-47C9-8F72-638020BEACC8}" type="datetimeFigureOut">
               <a:rPr lang="nl-BE" smtClean="0"/>
-              <a:t>27/09/2018</a:t>
+              <a:t>28/09/2018</a:t>
             </a:fld>
             <a:endParaRPr lang="nl-BE"/>
           </a:p>
@@ -5840,7 +5841,7 @@
           <p:cNvPr id="2" name="Titel 1">
             <a:extLst>
               <a:ext uri="{FF2B5EF4-FFF2-40B4-BE49-F238E27FC236}">
-                <a16:creationId xmlns:a16="http://schemas.microsoft.com/office/drawing/2014/main" id="{FF0454EE-4AC1-4267-B72B-34E9B40811D4}"/>
+                <a16:creationId xmlns:a16="http://schemas.microsoft.com/office/drawing/2014/main" xmlns="" id="{FF0454EE-4AC1-4267-B72B-34E9B40811D4}"/>
               </a:ext>
             </a:extLst>
           </p:cNvPr>
@@ -5868,7 +5869,7 @@
           <p:cNvPr id="3" name="Ondertitel 2">
             <a:extLst>
               <a:ext uri="{FF2B5EF4-FFF2-40B4-BE49-F238E27FC236}">
-                <a16:creationId xmlns:a16="http://schemas.microsoft.com/office/drawing/2014/main" id="{1E6BDA13-9E13-49BE-8003-A17B01BBBA83}"/>
+                <a16:creationId xmlns:a16="http://schemas.microsoft.com/office/drawing/2014/main" xmlns="" id="{1E6BDA13-9E13-49BE-8003-A17B01BBBA83}"/>
               </a:ext>
             </a:extLst>
           </p:cNvPr>
@@ -5950,7 +5951,7 @@
           <p:cNvPr id="2" name="Titel 1">
             <a:extLst>
               <a:ext uri="{FF2B5EF4-FFF2-40B4-BE49-F238E27FC236}">
-                <a16:creationId xmlns:a16="http://schemas.microsoft.com/office/drawing/2014/main" id="{4E2B63D7-14DE-47BA-BD19-FD4EA010D140}"/>
+                <a16:creationId xmlns:a16="http://schemas.microsoft.com/office/drawing/2014/main" xmlns="" id="{4E2B63D7-14DE-47BA-BD19-FD4EA010D140}"/>
               </a:ext>
             </a:extLst>
           </p:cNvPr>
@@ -5978,7 +5979,7 @@
           <p:cNvPr id="8" name="Tijdelijke aanduiding voor inhoud 7">
             <a:extLst>
               <a:ext uri="{FF2B5EF4-FFF2-40B4-BE49-F238E27FC236}">
-                <a16:creationId xmlns:a16="http://schemas.microsoft.com/office/drawing/2014/main" id="{B882C954-7834-4E2D-B75D-28512EBC9B7C}"/>
+                <a16:creationId xmlns:a16="http://schemas.microsoft.com/office/drawing/2014/main" xmlns="" id="{B882C954-7834-4E2D-B75D-28512EBC9B7C}"/>
               </a:ext>
             </a:extLst>
           </p:cNvPr>
@@ -6008,14 +6009,14 @@
                 <a:gridCol w="4298156">
                   <a:extLst>
                     <a:ext uri="{9D8B030D-6E8A-4147-A177-3AD203B41FA5}">
-                      <a16:colId xmlns:a16="http://schemas.microsoft.com/office/drawing/2014/main" val="1818900181"/>
+                      <a16:colId xmlns:a16="http://schemas.microsoft.com/office/drawing/2014/main" xmlns="" val="1818900181"/>
                     </a:ext>
                   </a:extLst>
                 </a:gridCol>
                 <a:gridCol w="4298156">
                   <a:extLst>
                     <a:ext uri="{9D8B030D-6E8A-4147-A177-3AD203B41FA5}">
-                      <a16:colId xmlns:a16="http://schemas.microsoft.com/office/drawing/2014/main" val="209719542"/>
+                      <a16:colId xmlns:a16="http://schemas.microsoft.com/office/drawing/2014/main" xmlns="" val="209719542"/>
                     </a:ext>
                   </a:extLst>
                 </a:gridCol>
@@ -6049,7 +6050,7 @@
                 </a:tc>
                 <a:extLst>
                   <a:ext uri="{0D108BD9-81ED-4DB2-BD59-A6C34878D82A}">
-                    <a16:rowId xmlns:a16="http://schemas.microsoft.com/office/drawing/2014/main" val="962589406"/>
+                    <a16:rowId xmlns:a16="http://schemas.microsoft.com/office/drawing/2014/main" xmlns="" val="962589406"/>
                   </a:ext>
                 </a:extLst>
               </a:tr>
@@ -6086,7 +6087,7 @@
                 </a:tc>
                 <a:extLst>
                   <a:ext uri="{0D108BD9-81ED-4DB2-BD59-A6C34878D82A}">
-                    <a16:rowId xmlns:a16="http://schemas.microsoft.com/office/drawing/2014/main" val="2693935319"/>
+                    <a16:rowId xmlns:a16="http://schemas.microsoft.com/office/drawing/2014/main" xmlns="" val="2693935319"/>
                   </a:ext>
                 </a:extLst>
               </a:tr>
@@ -6124,7 +6125,7 @@
                 </a:tc>
                 <a:extLst>
                   <a:ext uri="{0D108BD9-81ED-4DB2-BD59-A6C34878D82A}">
-                    <a16:rowId xmlns:a16="http://schemas.microsoft.com/office/drawing/2014/main" val="2461743231"/>
+                    <a16:rowId xmlns:a16="http://schemas.microsoft.com/office/drawing/2014/main" xmlns="" val="2461743231"/>
                   </a:ext>
                 </a:extLst>
               </a:tr>
@@ -6177,7 +6178,7 @@
                 </a:tc>
                 <a:extLst>
                   <a:ext uri="{0D108BD9-81ED-4DB2-BD59-A6C34878D82A}">
-                    <a16:rowId xmlns:a16="http://schemas.microsoft.com/office/drawing/2014/main" val="2907391449"/>
+                    <a16:rowId xmlns:a16="http://schemas.microsoft.com/office/drawing/2014/main" xmlns="" val="2907391449"/>
                   </a:ext>
                 </a:extLst>
               </a:tr>
@@ -6214,7 +6215,7 @@
                 </a:tc>
                 <a:extLst>
                   <a:ext uri="{0D108BD9-81ED-4DB2-BD59-A6C34878D82A}">
-                    <a16:rowId xmlns:a16="http://schemas.microsoft.com/office/drawing/2014/main" val="3895839695"/>
+                    <a16:rowId xmlns:a16="http://schemas.microsoft.com/office/drawing/2014/main" xmlns="" val="3895839695"/>
                   </a:ext>
                 </a:extLst>
               </a:tr>
@@ -6255,7 +6256,7 @@
                 </a:tc>
                 <a:extLst>
                   <a:ext uri="{0D108BD9-81ED-4DB2-BD59-A6C34878D82A}">
-                    <a16:rowId xmlns:a16="http://schemas.microsoft.com/office/drawing/2014/main" val="2863565315"/>
+                    <a16:rowId xmlns:a16="http://schemas.microsoft.com/office/drawing/2014/main" xmlns="" val="2863565315"/>
                   </a:ext>
                 </a:extLst>
               </a:tr>
@@ -6300,7 +6301,7 @@
                 </a:tc>
                 <a:extLst>
                   <a:ext uri="{0D108BD9-81ED-4DB2-BD59-A6C34878D82A}">
-                    <a16:rowId xmlns:a16="http://schemas.microsoft.com/office/drawing/2014/main" val="984286687"/>
+                    <a16:rowId xmlns:a16="http://schemas.microsoft.com/office/drawing/2014/main" xmlns="" val="984286687"/>
                   </a:ext>
                 </a:extLst>
               </a:tr>
@@ -6343,7 +6344,7 @@
           <p:cNvPr id="2" name="Titel 1">
             <a:extLst>
               <a:ext uri="{FF2B5EF4-FFF2-40B4-BE49-F238E27FC236}">
-                <a16:creationId xmlns:a16="http://schemas.microsoft.com/office/drawing/2014/main" id="{3389160F-B341-4D25-BB19-183AB7C8886F}"/>
+                <a16:creationId xmlns:a16="http://schemas.microsoft.com/office/drawing/2014/main" xmlns="" id="{3389160F-B341-4D25-BB19-183AB7C8886F}"/>
               </a:ext>
             </a:extLst>
           </p:cNvPr>
@@ -6371,7 +6372,7 @@
           <p:cNvPr id="3" name="Tijdelijke aanduiding voor inhoud 2">
             <a:extLst>
               <a:ext uri="{FF2B5EF4-FFF2-40B4-BE49-F238E27FC236}">
-                <a16:creationId xmlns:a16="http://schemas.microsoft.com/office/drawing/2014/main" id="{2C0FDCF2-C611-4611-85F6-CF6EB63FAC2C}"/>
+                <a16:creationId xmlns:a16="http://schemas.microsoft.com/office/drawing/2014/main" xmlns="" id="{2C0FDCF2-C611-4611-85F6-CF6EB63FAC2C}"/>
               </a:ext>
             </a:extLst>
           </p:cNvPr>
@@ -6448,7 +6449,7 @@
           <p:cNvPr id="2" name="Titel 1">
             <a:extLst>
               <a:ext uri="{FF2B5EF4-FFF2-40B4-BE49-F238E27FC236}">
-                <a16:creationId xmlns:a16="http://schemas.microsoft.com/office/drawing/2014/main" id="{89D74949-1EE5-46CA-915B-DE54B7DB42DB}"/>
+                <a16:creationId xmlns:a16="http://schemas.microsoft.com/office/drawing/2014/main" xmlns="" id="{89D74949-1EE5-46CA-915B-DE54B7DB42DB}"/>
               </a:ext>
             </a:extLst>
           </p:cNvPr>
@@ -6476,7 +6477,7 @@
           <p:cNvPr id="3" name="Tijdelijke aanduiding voor inhoud 2">
             <a:extLst>
               <a:ext uri="{FF2B5EF4-FFF2-40B4-BE49-F238E27FC236}">
-                <a16:creationId xmlns:a16="http://schemas.microsoft.com/office/drawing/2014/main" id="{97755AAA-5A5F-4403-B5D0-C6A1D6834058}"/>
+                <a16:creationId xmlns:a16="http://schemas.microsoft.com/office/drawing/2014/main" xmlns="" id="{97755AAA-5A5F-4403-B5D0-C6A1D6834058}"/>
               </a:ext>
             </a:extLst>
           </p:cNvPr>
@@ -6495,7 +6496,7 @@
         </p:spPr>
         <p:txBody>
           <a:bodyPr>
-            <a:normAutofit fontScale="92500" lnSpcReduction="10000"/>
+            <a:normAutofit/>
           </a:bodyPr>
           <a:lstStyle/>
           <a:p>
@@ -6546,47 +6547,19 @@
           </a:p>
           <a:p>
             <a:r>
+              <a:rPr lang="nl-BE" dirty="0" smtClean="0"/>
+              <a:t>PCB</a:t>
+            </a:r>
+            <a:endParaRPr lang="nl-BE" dirty="0"/>
+          </a:p>
+          <a:p>
+            <a:r>
+              <a:rPr lang="nl-BE" dirty="0" smtClean="0"/>
+              <a:t>Kunststof </a:t>
+            </a:r>
+            <a:r>
               <a:rPr lang="nl-BE" dirty="0"/>
-              <a:t>PCB</a:t>
-            </a:r>
-          </a:p>
-          <a:p>
-            <a:r>
-              <a:rPr lang="nl-BE" dirty="0"/>
-              <a:t>Plastic Water </a:t>
-            </a:r>
-            <a:r>
-              <a:rPr lang="nl-BE" dirty="0" err="1"/>
-              <a:t>Solenoid</a:t>
-            </a:r>
-            <a:r>
-              <a:rPr lang="nl-BE" dirty="0"/>
-              <a:t> </a:t>
-            </a:r>
-            <a:r>
-              <a:rPr lang="nl-BE" dirty="0" err="1"/>
-              <a:t>Valve</a:t>
-            </a:r>
-            <a:r>
-              <a:rPr lang="nl-BE" dirty="0"/>
-              <a:t> – 12 V – 1/2” </a:t>
-            </a:r>
-            <a:r>
-              <a:rPr lang="nl-BE" dirty="0" err="1"/>
-              <a:t>Nominal</a:t>
-            </a:r>
-            <a:endParaRPr lang="nl-BE" dirty="0"/>
-          </a:p>
-          <a:p>
-            <a:r>
-              <a:rPr lang="nl-BE" dirty="0"/>
-              <a:t>SLV – Transformer 60 W 12 V</a:t>
-            </a:r>
-          </a:p>
-          <a:p>
-            <a:r>
-              <a:rPr lang="nl-BE" dirty="0"/>
-              <a:t>Kunststof water magneetventiel – 12V</a:t>
+              <a:t>water magneetventiel – 12V</a:t>
             </a:r>
           </a:p>
           <a:p>
@@ -6629,10 +6602,113 @@
       </p:grpSpPr>
       <p:sp>
         <p:nvSpPr>
+          <p:cNvPr id="2" name="Title 1"/>
+          <p:cNvSpPr>
+            <a:spLocks noGrp="1"/>
+          </p:cNvSpPr>
+          <p:nvPr>
+            <p:ph type="title"/>
+          </p:nvPr>
+        </p:nvSpPr>
+        <p:spPr/>
+        <p:txBody>
+          <a:bodyPr/>
+          <a:lstStyle/>
+          <a:p>
+            <a:r>
+              <a:rPr lang="en-US" dirty="0" err="1" smtClean="0"/>
+              <a:t>Algemene</a:t>
+            </a:r>
+            <a:r>
+              <a:rPr lang="en-US" dirty="0" smtClean="0"/>
+              <a:t> </a:t>
+            </a:r>
+            <a:r>
+              <a:rPr lang="en-US" dirty="0" err="1" smtClean="0"/>
+              <a:t>architectuur</a:t>
+            </a:r>
+            <a:endParaRPr lang="en-US" dirty="0"/>
+          </a:p>
+        </p:txBody>
+      </p:sp>
+      <p:pic>
+        <p:nvPicPr>
+          <p:cNvPr id="6" name="Content Placeholder 5"/>
+          <p:cNvPicPr>
+            <a:picLocks noGrp="1" noChangeAspect="1"/>
+          </p:cNvPicPr>
+          <p:nvPr>
+            <p:ph idx="1"/>
+          </p:nvPr>
+        </p:nvPicPr>
+        <p:blipFill>
+          <a:blip r:embed="rId2">
+            <a:extLst>
+              <a:ext uri="{28A0092B-C50C-407E-A947-70E740481C1C}">
+                <a14:useLocalDpi xmlns:a14="http://schemas.microsoft.com/office/drawing/2010/main" val="0"/>
+              </a:ext>
+            </a:extLst>
+          </a:blip>
+          <a:stretch>
+            <a:fillRect/>
+          </a:stretch>
+        </p:blipFill>
+        <p:spPr bwMode="auto">
+          <a:xfrm>
+            <a:off x="2312356" y="2160588"/>
+            <a:ext cx="5327325" cy="3881437"/>
+          </a:xfrm>
+          <a:prstGeom prst="rect">
+            <a:avLst/>
+          </a:prstGeom>
+          <a:noFill/>
+          <a:extLst>
+            <a:ext uri="{909E8E84-426E-40DD-AFC4-6F175D3DCCD1}">
+              <a14:hiddenFill xmlns:a14="http://schemas.microsoft.com/office/drawing/2010/main">
+                <a:solidFill>
+                  <a:srgbClr val="FFFFFF"/>
+                </a:solidFill>
+              </a14:hiddenFill>
+            </a:ext>
+          </a:extLst>
+        </p:spPr>
+      </p:pic>
+    </p:spTree>
+    <p:extLst>
+      <p:ext uri="{BB962C8B-B14F-4D97-AF65-F5344CB8AC3E}">
+        <p14:creationId xmlns:p14="http://schemas.microsoft.com/office/powerpoint/2010/main" val="1096754162"/>
+      </p:ext>
+    </p:extLst>
+  </p:cSld>
+  <p:clrMapOvr>
+    <a:masterClrMapping/>
+  </p:clrMapOvr>
+</p:sld>
+</file>
+
+<file path=ppt/slides/slide6.xml><?xml version="1.0" encoding="utf-8"?>
+<p:sld xmlns:a="http://schemas.openxmlformats.org/drawingml/2006/main" xmlns:r="http://schemas.openxmlformats.org/officeDocument/2006/relationships" xmlns:p="http://schemas.openxmlformats.org/presentationml/2006/main">
+  <p:cSld>
+    <p:spTree>
+      <p:nvGrpSpPr>
+        <p:cNvPr id="1" name=""/>
+        <p:cNvGrpSpPr/>
+        <p:nvPr/>
+      </p:nvGrpSpPr>
+      <p:grpSpPr>
+        <a:xfrm>
+          <a:off x="0" y="0"/>
+          <a:ext cx="0" cy="0"/>
+          <a:chOff x="0" y="0"/>
+          <a:chExt cx="0" cy="0"/>
+        </a:xfrm>
+      </p:grpSpPr>
+      <p:sp>
+        <p:nvSpPr>
           <p:cNvPr id="2" name="Titel 1">
             <a:extLst>
               <a:ext uri="{FF2B5EF4-FFF2-40B4-BE49-F238E27FC236}">
-                <a16:creationId xmlns:a16="http://schemas.microsoft.com/office/drawing/2014/main" id="{3EF32F67-E121-4EA9-B093-EEB5A4AD11BA}"/>
+                <a16:creationId xmlns:a16="http://schemas.microsoft.com/office/drawing/2014/main" xmlns="" id="{3EF32F67-E121-4EA9-B093-EEB5A4AD11BA}"/>
               </a:ext>
             </a:extLst>
           </p:cNvPr>
@@ -6660,7 +6736,7 @@
           <p:cNvPr id="5" name="Content Placeholder 4">
             <a:extLst>
               <a:ext uri="{FF2B5EF4-FFF2-40B4-BE49-F238E27FC236}">
-                <a16:creationId xmlns:a16="http://schemas.microsoft.com/office/drawing/2014/main" id="{D73CB228-7069-40EB-85F4-67039A401373}"/>
+                <a16:creationId xmlns:a16="http://schemas.microsoft.com/office/drawing/2014/main" xmlns="" id="{D73CB228-7069-40EB-85F4-67039A401373}"/>
               </a:ext>
             </a:extLst>
           </p:cNvPr>
@@ -6703,7 +6779,7 @@
 </p:sld>
 </file>
 
-<file path=ppt/slides/slide6.xml><?xml version="1.0" encoding="utf-8"?>
+<file path=ppt/slides/slide7.xml><?xml version="1.0" encoding="utf-8"?>
 <p:sld xmlns:a="http://schemas.openxmlformats.org/drawingml/2006/main" xmlns:r="http://schemas.openxmlformats.org/officeDocument/2006/relationships" xmlns:p="http://schemas.openxmlformats.org/presentationml/2006/main">
   <p:cSld>
     <p:spTree>
@@ -6725,7 +6801,7 @@
           <p:cNvPr id="2" name="Titel 1">
             <a:extLst>
               <a:ext uri="{FF2B5EF4-FFF2-40B4-BE49-F238E27FC236}">
-                <a16:creationId xmlns:a16="http://schemas.microsoft.com/office/drawing/2014/main" id="{2BF0B6A8-716F-40AE-BA30-68A43D601D29}"/>
+                <a16:creationId xmlns:a16="http://schemas.microsoft.com/office/drawing/2014/main" xmlns="" id="{2BF0B6A8-716F-40AE-BA30-68A43D601D29}"/>
               </a:ext>
             </a:extLst>
           </p:cNvPr>
@@ -6753,7 +6829,7 @@
           <p:cNvPr id="5" name="Content Placeholder 4">
             <a:extLst>
               <a:ext uri="{FF2B5EF4-FFF2-40B4-BE49-F238E27FC236}">
-                <a16:creationId xmlns:a16="http://schemas.microsoft.com/office/drawing/2014/main" id="{71BAD982-B2BD-4D1D-9904-4559AE1DE972}"/>
+                <a16:creationId xmlns:a16="http://schemas.microsoft.com/office/drawing/2014/main" xmlns="" id="{71BAD982-B2BD-4D1D-9904-4559AE1DE972}"/>
               </a:ext>
             </a:extLst>
           </p:cNvPr>
@@ -6796,7 +6872,7 @@
 </p:sld>
 </file>
 
-<file path=ppt/slides/slide7.xml><?xml version="1.0" encoding="utf-8"?>
+<file path=ppt/slides/slide8.xml><?xml version="1.0" encoding="utf-8"?>
 <p:sld xmlns:a="http://schemas.openxmlformats.org/drawingml/2006/main" xmlns:r="http://schemas.openxmlformats.org/officeDocument/2006/relationships" xmlns:p="http://schemas.openxmlformats.org/presentationml/2006/main">
   <p:cSld>
     <p:spTree>
@@ -6818,7 +6894,7 @@
           <p:cNvPr id="2" name="Titel 1">
             <a:extLst>
               <a:ext uri="{FF2B5EF4-FFF2-40B4-BE49-F238E27FC236}">
-                <a16:creationId xmlns:a16="http://schemas.microsoft.com/office/drawing/2014/main" id="{666DF6CE-66CF-4CA9-BFDE-916C26168080}"/>
+                <a16:creationId xmlns:a16="http://schemas.microsoft.com/office/drawing/2014/main" xmlns="" id="{666DF6CE-66CF-4CA9-BFDE-916C26168080}"/>
               </a:ext>
             </a:extLst>
           </p:cNvPr>
@@ -6846,7 +6922,7 @@
           <p:cNvPr id="5" name="Content Placeholder 4">
             <a:extLst>
               <a:ext uri="{FF2B5EF4-FFF2-40B4-BE49-F238E27FC236}">
-                <a16:creationId xmlns:a16="http://schemas.microsoft.com/office/drawing/2014/main" id="{E188638D-303C-4011-990B-07C061C7674B}"/>
+                <a16:creationId xmlns:a16="http://schemas.microsoft.com/office/drawing/2014/main" xmlns="" id="{E188638D-303C-4011-990B-07C061C7674B}"/>
               </a:ext>
             </a:extLst>
           </p:cNvPr>

</xml_diff>